<commit_message>
updated toggle picture/typfout uit gehaald
</commit_message>
<xml_diff>
--- a/Powerpoints/Presentatie Week01.pptx
+++ b/Powerpoints/Presentatie Week01.pptx
@@ -22,13 +22,13 @@
   <p:notesSz cx="6858000" cy="9144000"/>
   <p:embeddedFontLst>
     <p:embeddedFont>
-      <p:font typeface="Abel" panose="020B0604020202020204" charset="0"/>
+      <p:font typeface="Roboto Slab" panose="020B0604020202020204" charset="0"/>
       <p:regular r:id="rId12"/>
+      <p:bold r:id="rId13"/>
     </p:embeddedFont>
     <p:embeddedFont>
-      <p:font typeface="Roboto Slab" panose="020B0604020202020204" charset="0"/>
-      <p:regular r:id="rId13"/>
-      <p:bold r:id="rId14"/>
+      <p:font typeface="Abel" panose="020B0604020202020204" charset="0"/>
+      <p:regular r:id="rId14"/>
     </p:embeddedFont>
   </p:embeddedFontLst>
   <p:defaultTextStyle>
@@ -50992,35 +50992,6 @@
       </p:sp>
       <p:pic>
         <p:nvPicPr>
-          <p:cNvPr id="3" name="Picture 2">
-            <a:extLst>
-              <a:ext uri="{FF2B5EF4-FFF2-40B4-BE49-F238E27FC236}">
-                <a16:creationId xmlns:a16="http://schemas.microsoft.com/office/drawing/2014/main" id="{6203D25A-4C32-424B-BD46-9BF7A7D4AF5E}"/>
-              </a:ext>
-            </a:extLst>
-          </p:cNvPr>
-          <p:cNvPicPr>
-            <a:picLocks noChangeAspect="1"/>
-          </p:cNvPicPr>
-          <p:nvPr/>
-        </p:nvPicPr>
-        <p:blipFill rotWithShape="1">
-          <a:blip r:embed="rId2"/>
-          <a:srcRect l="6208" t="5072" b="-635"/>
-          <a:stretch/>
-        </p:blipFill>
-        <p:spPr>
-          <a:xfrm>
-            <a:off x="4138163" y="2677197"/>
-            <a:ext cx="4789569" cy="1755382"/>
-          </a:xfrm>
-          <a:prstGeom prst="rect">
-            <a:avLst/>
-          </a:prstGeom>
-        </p:spPr>
-      </p:pic>
-      <p:pic>
-        <p:nvPicPr>
           <p:cNvPr id="5" name="Picture 4">
             <a:extLst>
               <a:ext uri="{FF2B5EF4-FFF2-40B4-BE49-F238E27FC236}">
@@ -51034,7 +51005,7 @@
           <p:nvPr/>
         </p:nvPicPr>
         <p:blipFill>
-          <a:blip r:embed="rId3"/>
+          <a:blip r:embed="rId2"/>
           <a:stretch>
             <a:fillRect/>
           </a:stretch>
@@ -51047,6 +51018,53 @@
           <a:prstGeom prst="rect">
             <a:avLst/>
           </a:prstGeom>
+        </p:spPr>
+      </p:pic>
+      <p:pic>
+        <p:nvPicPr>
+          <p:cNvPr id="1028" name="Picture 4" descr="https://cdn.discordapp.com/attachments/425217226140811264/533001404407611406/unknown.png">
+            <a:extLst>
+              <a:ext uri="{FF2B5EF4-FFF2-40B4-BE49-F238E27FC236}">
+                <a16:creationId xmlns:a16="http://schemas.microsoft.com/office/drawing/2014/main" id="{8D9F45DE-1BFC-48A6-9EE2-3981EB31C6F2}"/>
+              </a:ext>
+            </a:extLst>
+          </p:cNvPr>
+          <p:cNvPicPr>
+            <a:picLocks noChangeAspect="1" noChangeArrowheads="1"/>
+          </p:cNvPicPr>
+          <p:nvPr/>
+        </p:nvPicPr>
+        <p:blipFill>
+          <a:blip r:embed="rId3">
+            <a:extLst>
+              <a:ext uri="{28A0092B-C50C-407E-A947-70E740481C1C}">
+                <a14:useLocalDpi xmlns:a14="http://schemas.microsoft.com/office/drawing/2010/main" val="0"/>
+              </a:ext>
+            </a:extLst>
+          </a:blip>
+          <a:srcRect/>
+          <a:stretch>
+            <a:fillRect/>
+          </a:stretch>
+        </p:blipFill>
+        <p:spPr bwMode="auto">
+          <a:xfrm>
+            <a:off x="4318370" y="1422188"/>
+            <a:ext cx="4348557" cy="3327663"/>
+          </a:xfrm>
+          <a:prstGeom prst="rect">
+            <a:avLst/>
+          </a:prstGeom>
+          <a:noFill/>
+          <a:extLst>
+            <a:ext uri="{909E8E84-426E-40DD-AFC4-6F175D3DCCD1}">
+              <a14:hiddenFill xmlns:a14="http://schemas.microsoft.com/office/drawing/2010/main">
+                <a:solidFill>
+                  <a:srgbClr val="FFFFFF"/>
+                </a:solidFill>
+              </a14:hiddenFill>
+            </a:ext>
+          </a:extLst>
         </p:spPr>
       </p:pic>
     </p:spTree>
@@ -51176,7 +51194,7 @@
             </a:r>
             <a:r>
               <a:rPr lang="en-US" dirty="0" err="1"/>
-              <a:t>naukeuriger</a:t>
+              <a:t>nauwkeuriger</a:t>
             </a:r>
             <a:r>
               <a:rPr lang="en-US" dirty="0"/>

</xml_diff>